<commit_message>
for our next section and Feb 8
</commit_message>
<xml_diff>
--- a/KaipingAdina's Section Material/Lab1/Section2_Lab1.pptx
+++ b/KaipingAdina's Section Material/Lab1/Section2_Lab1.pptx
@@ -151,7 +151,7 @@
   </p:defaultTextStyle>
   <p:extLst>
     <p:ext uri="{EFAFB233-063F-42B5-8137-9DF3F51BA10A}">
-      <p15:sldGuideLst xmlns:p15="http://schemas.microsoft.com/office/powerpoint/2012/main" xmlns="">
+      <p15:sldGuideLst xmlns="" xmlns:p15="http://schemas.microsoft.com/office/powerpoint/2012/main">
         <p15:guide id="1" orient="horz" pos="1620">
           <p15:clr>
             <a:srgbClr val="A4A3A4"/>
@@ -270,7 +270,7 @@
             <a:fld id="{CAB1EE62-9229-464B-9475-CBB16B62B2C7}" type="datetimeFigureOut">
               <a:rPr lang="en-US" altLang="x-none"/>
               <a:pPr/>
-              <a:t>1/23/17</a:t>
+              <a:t>1/30/17</a:t>
             </a:fld>
             <a:endParaRPr lang="en-US" altLang="x-none"/>
           </a:p>
@@ -476,7 +476,7 @@
             <a:fld id="{CBB815AF-F648-9E4A-8316-BB240D8FD2E6}" type="datetimeFigureOut">
               <a:rPr lang="en-US" altLang="x-none"/>
               <a:pPr/>
-              <a:t>1/23/17</a:t>
+              <a:t>1/30/17</a:t>
             </a:fld>
             <a:endParaRPr lang="en-US" altLang="x-none"/>
           </a:p>
@@ -850,11 +850,7 @@
           <a:p>
             <a:r>
               <a:rPr lang="en-US" dirty="0" smtClean="0"/>
-              <a:t>1 </a:t>
-            </a:r>
-            <a:r>
-              <a:rPr lang="en-US" dirty="0" smtClean="0"/>
-              <a:t>minute</a:t>
+              <a:t>1 minute</a:t>
             </a:r>
             <a:endParaRPr lang="en-US" dirty="0"/>
           </a:p>
@@ -7437,10 +7433,6 @@
               </a:rPr>
               <a:t>Work on Lab 1 with your group</a:t>
             </a:r>
-            <a:endParaRPr lang="en-US" altLang="x-none" b="1" dirty="0" smtClean="0">
-              <a:latin typeface="Arial" charset="0"/>
-              <a:ea typeface="ＭＳ Ｐゴシック" charset="-128"/>
-            </a:endParaRPr>
           </a:p>
         </p:txBody>
       </p:sp>
@@ -7655,14 +7647,7 @@
                 <a:latin typeface="Arial" charset="0"/>
                 <a:ea typeface="ＭＳ Ｐゴシック" charset="-128"/>
               </a:rPr>
-              <a:t>Key Concept 3: </a:t>
-            </a:r>
-            <a:r>
-              <a:rPr lang="en-US" altLang="x-none" dirty="0" smtClean="0">
-                <a:latin typeface="Arial" charset="0"/>
-                <a:ea typeface="ＭＳ Ｐゴシック" charset="-128"/>
-              </a:rPr>
-              <a:t>Indexing</a:t>
+              <a:t>Key Concept 3: Indexing</a:t>
             </a:r>
             <a:endParaRPr lang="en-US" altLang="x-none" dirty="0">
               <a:latin typeface="Arial" charset="0"/>
@@ -7984,35 +7969,7 @@
                 <a:ea typeface="Courier New" charset="0"/>
                 <a:cs typeface="Courier New" charset="0"/>
               </a:rPr>
-              <a:t>-indexing</a:t>
-            </a:r>
-            <a:r>
-              <a:rPr lang="en-US" dirty="0" smtClean="0">
-                <a:solidFill>
-                  <a:schemeClr val="tx1">
-                    <a:lumMod val="65000"/>
-                    <a:lumOff val="35000"/>
-                  </a:schemeClr>
-                </a:solidFill>
-                <a:latin typeface="Courier New" charset="0"/>
-                <a:ea typeface="Courier New" charset="0"/>
-                <a:cs typeface="Courier New" charset="0"/>
-              </a:rPr>
-              <a:t>: extract certain rows and </a:t>
-            </a:r>
-            <a:r>
-              <a:rPr lang="en-US" dirty="0" smtClean="0">
-                <a:solidFill>
-                  <a:schemeClr val="tx1">
-                    <a:lumMod val="65000"/>
-                    <a:lumOff val="35000"/>
-                  </a:schemeClr>
-                </a:solidFill>
-                <a:latin typeface="Courier New" charset="0"/>
-                <a:ea typeface="Courier New" charset="0"/>
-                <a:cs typeface="Courier New" charset="0"/>
-              </a:rPr>
-              <a:t>columns</a:t>
+              <a:t>-indexing: extract certain rows and columns</a:t>
             </a:r>
           </a:p>
           <a:p>
@@ -9055,15 +9012,6 @@
               </a:rPr>
               <a:t>What DOES the explaining? (College English Major)</a:t>
             </a:r>
-            <a:endParaRPr lang="en-US" dirty="0" smtClean="0">
-              <a:solidFill>
-                <a:schemeClr val="tx1">
-                  <a:lumMod val="65000"/>
-                  <a:lumOff val="35000"/>
-                </a:schemeClr>
-              </a:solidFill>
-              <a:ea typeface="+mn-ea"/>
-            </a:endParaRPr>
           </a:p>
         </p:txBody>
       </p:sp>

</xml_diff>